<commit_message>
jen's done a bunch of work.  a lot of readmes.
</commit_message>
<xml_diff>
--- a/Documentation/model_diagram.pptx
+++ b/Documentation/model_diagram.pptx
@@ -288,7 +288,8 @@
           <a:p>
             <a:fld id="{099E952F-5AF8-5244-87AA-20BA42B9E454}" type="datetimeFigureOut">
               <a:rPr lang="en-US" smtClean="0"/>
-              <a:t>5/15/12</a:t>
+              <a:pPr/>
+              <a:t>5/29/12</a:t>
             </a:fld>
             <a:endParaRPr lang="en-US"/>
           </a:p>
@@ -330,6 +331,7 @@
           <a:p>
             <a:fld id="{A7240E92-AA54-9A45-99AF-19C5ED7F9D83}" type="slidenum">
               <a:rPr lang="en-US" smtClean="0"/>
+              <a:pPr/>
               <a:t>‹#›</a:t>
             </a:fld>
             <a:endParaRPr lang="en-US"/>
@@ -453,7 +455,8 @@
           <a:p>
             <a:fld id="{099E952F-5AF8-5244-87AA-20BA42B9E454}" type="datetimeFigureOut">
               <a:rPr lang="en-US" smtClean="0"/>
-              <a:t>5/15/12</a:t>
+              <a:pPr/>
+              <a:t>5/29/12</a:t>
             </a:fld>
             <a:endParaRPr lang="en-US"/>
           </a:p>
@@ -495,6 +498,7 @@
           <a:p>
             <a:fld id="{A7240E92-AA54-9A45-99AF-19C5ED7F9D83}" type="slidenum">
               <a:rPr lang="en-US" smtClean="0"/>
+              <a:pPr/>
               <a:t>‹#›</a:t>
             </a:fld>
             <a:endParaRPr lang="en-US"/>
@@ -628,7 +632,8 @@
           <a:p>
             <a:fld id="{099E952F-5AF8-5244-87AA-20BA42B9E454}" type="datetimeFigureOut">
               <a:rPr lang="en-US" smtClean="0"/>
-              <a:t>5/15/12</a:t>
+              <a:pPr/>
+              <a:t>5/29/12</a:t>
             </a:fld>
             <a:endParaRPr lang="en-US"/>
           </a:p>
@@ -670,6 +675,7 @@
           <a:p>
             <a:fld id="{A7240E92-AA54-9A45-99AF-19C5ED7F9D83}" type="slidenum">
               <a:rPr lang="en-US" smtClean="0"/>
+              <a:pPr/>
               <a:t>‹#›</a:t>
             </a:fld>
             <a:endParaRPr lang="en-US"/>
@@ -793,7 +799,8 @@
           <a:p>
             <a:fld id="{099E952F-5AF8-5244-87AA-20BA42B9E454}" type="datetimeFigureOut">
               <a:rPr lang="en-US" smtClean="0"/>
-              <a:t>5/15/12</a:t>
+              <a:pPr/>
+              <a:t>5/29/12</a:t>
             </a:fld>
             <a:endParaRPr lang="en-US"/>
           </a:p>
@@ -835,6 +842,7 @@
           <a:p>
             <a:fld id="{A7240E92-AA54-9A45-99AF-19C5ED7F9D83}" type="slidenum">
               <a:rPr lang="en-US" smtClean="0"/>
+              <a:pPr/>
               <a:t>‹#›</a:t>
             </a:fld>
             <a:endParaRPr lang="en-US"/>
@@ -1034,7 +1042,8 @@
           <a:p>
             <a:fld id="{099E952F-5AF8-5244-87AA-20BA42B9E454}" type="datetimeFigureOut">
               <a:rPr lang="en-US" smtClean="0"/>
-              <a:t>5/15/12</a:t>
+              <a:pPr/>
+              <a:t>5/29/12</a:t>
             </a:fld>
             <a:endParaRPr lang="en-US"/>
           </a:p>
@@ -1076,6 +1085,7 @@
           <a:p>
             <a:fld id="{A7240E92-AA54-9A45-99AF-19C5ED7F9D83}" type="slidenum">
               <a:rPr lang="en-US" smtClean="0"/>
+              <a:pPr/>
               <a:t>‹#›</a:t>
             </a:fld>
             <a:endParaRPr lang="en-US"/>
@@ -1317,7 +1327,8 @@
           <a:p>
             <a:fld id="{099E952F-5AF8-5244-87AA-20BA42B9E454}" type="datetimeFigureOut">
               <a:rPr lang="en-US" smtClean="0"/>
-              <a:t>5/15/12</a:t>
+              <a:pPr/>
+              <a:t>5/29/12</a:t>
             </a:fld>
             <a:endParaRPr lang="en-US"/>
           </a:p>
@@ -1359,6 +1370,7 @@
           <a:p>
             <a:fld id="{A7240E92-AA54-9A45-99AF-19C5ED7F9D83}" type="slidenum">
               <a:rPr lang="en-US" smtClean="0"/>
+              <a:pPr/>
               <a:t>‹#›</a:t>
             </a:fld>
             <a:endParaRPr lang="en-US"/>
@@ -1734,7 +1746,8 @@
           <a:p>
             <a:fld id="{099E952F-5AF8-5244-87AA-20BA42B9E454}" type="datetimeFigureOut">
               <a:rPr lang="en-US" smtClean="0"/>
-              <a:t>5/15/12</a:t>
+              <a:pPr/>
+              <a:t>5/29/12</a:t>
             </a:fld>
             <a:endParaRPr lang="en-US"/>
           </a:p>
@@ -1776,6 +1789,7 @@
           <a:p>
             <a:fld id="{A7240E92-AA54-9A45-99AF-19C5ED7F9D83}" type="slidenum">
               <a:rPr lang="en-US" smtClean="0"/>
+              <a:pPr/>
               <a:t>‹#›</a:t>
             </a:fld>
             <a:endParaRPr lang="en-US"/>
@@ -1847,7 +1861,8 @@
           <a:p>
             <a:fld id="{099E952F-5AF8-5244-87AA-20BA42B9E454}" type="datetimeFigureOut">
               <a:rPr lang="en-US" smtClean="0"/>
-              <a:t>5/15/12</a:t>
+              <a:pPr/>
+              <a:t>5/29/12</a:t>
             </a:fld>
             <a:endParaRPr lang="en-US"/>
           </a:p>
@@ -1889,6 +1904,7 @@
           <a:p>
             <a:fld id="{A7240E92-AA54-9A45-99AF-19C5ED7F9D83}" type="slidenum">
               <a:rPr lang="en-US" smtClean="0"/>
+              <a:pPr/>
               <a:t>‹#›</a:t>
             </a:fld>
             <a:endParaRPr lang="en-US"/>
@@ -1937,7 +1953,8 @@
           <a:p>
             <a:fld id="{099E952F-5AF8-5244-87AA-20BA42B9E454}" type="datetimeFigureOut">
               <a:rPr lang="en-US" smtClean="0"/>
-              <a:t>5/15/12</a:t>
+              <a:pPr/>
+              <a:t>5/29/12</a:t>
             </a:fld>
             <a:endParaRPr lang="en-US"/>
           </a:p>
@@ -1979,6 +1996,7 @@
           <a:p>
             <a:fld id="{A7240E92-AA54-9A45-99AF-19C5ED7F9D83}" type="slidenum">
               <a:rPr lang="en-US" smtClean="0"/>
+              <a:pPr/>
               <a:t>‹#›</a:t>
             </a:fld>
             <a:endParaRPr lang="en-US"/>
@@ -2209,7 +2227,8 @@
           <a:p>
             <a:fld id="{099E952F-5AF8-5244-87AA-20BA42B9E454}" type="datetimeFigureOut">
               <a:rPr lang="en-US" smtClean="0"/>
-              <a:t>5/15/12</a:t>
+              <a:pPr/>
+              <a:t>5/29/12</a:t>
             </a:fld>
             <a:endParaRPr lang="en-US"/>
           </a:p>
@@ -2251,6 +2270,7 @@
           <a:p>
             <a:fld id="{A7240E92-AA54-9A45-99AF-19C5ED7F9D83}" type="slidenum">
               <a:rPr lang="en-US" smtClean="0"/>
+              <a:pPr/>
               <a:t>‹#›</a:t>
             </a:fld>
             <a:endParaRPr lang="en-US"/>
@@ -2457,7 +2477,8 @@
           <a:p>
             <a:fld id="{099E952F-5AF8-5244-87AA-20BA42B9E454}" type="datetimeFigureOut">
               <a:rPr lang="en-US" smtClean="0"/>
-              <a:t>5/15/12</a:t>
+              <a:pPr/>
+              <a:t>5/29/12</a:t>
             </a:fld>
             <a:endParaRPr lang="en-US"/>
           </a:p>
@@ -2499,6 +2520,7 @@
           <a:p>
             <a:fld id="{A7240E92-AA54-9A45-99AF-19C5ED7F9D83}" type="slidenum">
               <a:rPr lang="en-US" smtClean="0"/>
+              <a:pPr/>
               <a:t>‹#›</a:t>
             </a:fld>
             <a:endParaRPr lang="en-US"/>
@@ -2665,7 +2687,8 @@
           <a:p>
             <a:fld id="{099E952F-5AF8-5244-87AA-20BA42B9E454}" type="datetimeFigureOut">
               <a:rPr lang="en-US" smtClean="0"/>
-              <a:t>5/15/12</a:t>
+              <a:pPr/>
+              <a:t>5/29/12</a:t>
             </a:fld>
             <a:endParaRPr lang="en-US"/>
           </a:p>
@@ -2743,6 +2766,7 @@
           <a:p>
             <a:fld id="{A7240E92-AA54-9A45-99AF-19C5ED7F9D83}" type="slidenum">
               <a:rPr lang="en-US" smtClean="0"/>
+              <a:pPr/>
               <a:t>‹#›</a:t>
             </a:fld>
             <a:endParaRPr lang="en-US"/>
@@ -3088,8 +3112,8 @@
         </p:nvSpPr>
         <p:spPr>
           <a:xfrm>
-            <a:off x="211667" y="2048933"/>
-            <a:ext cx="3767666" cy="2692400"/>
+            <a:off x="524934" y="1413933"/>
+            <a:ext cx="2201334" cy="3327400"/>
           </a:xfrm>
           <a:prstGeom prst="roundRect">
             <a:avLst/>
@@ -3132,8 +3156,8 @@
         </p:nvSpPr>
         <p:spPr>
           <a:xfrm>
-            <a:off x="4165600" y="2048933"/>
-            <a:ext cx="2311399" cy="2692400"/>
+            <a:off x="3458634" y="1413933"/>
+            <a:ext cx="2311399" cy="3327400"/>
           </a:xfrm>
           <a:prstGeom prst="roundRect">
             <a:avLst/>
@@ -3176,8 +3200,8 @@
         </p:nvSpPr>
         <p:spPr>
           <a:xfrm>
-            <a:off x="6663267" y="2048933"/>
-            <a:ext cx="2294466" cy="2692400"/>
+            <a:off x="6498166" y="1413933"/>
+            <a:ext cx="2294466" cy="3327400"/>
           </a:xfrm>
           <a:prstGeom prst="roundRect">
             <a:avLst/>
@@ -3220,8 +3244,8 @@
         </p:nvSpPr>
         <p:spPr>
           <a:xfrm>
-            <a:off x="1193800" y="491067"/>
-            <a:ext cx="6874933" cy="461665"/>
+            <a:off x="1193800" y="270933"/>
+            <a:ext cx="6874933" cy="830997"/>
           </a:xfrm>
           <a:prstGeom prst="rect">
             <a:avLst/>
@@ -3237,7 +3261,22 @@
             <a:pPr algn="ctr"/>
             <a:r>
               <a:rPr lang="en-US" sz="2400" b="1" dirty="0" smtClean="0"/>
-              <a:t>Structure of the Model Hierarchy (V1) </a:t>
+              <a:t>Structure of the Model Hierarchy (</a:t>
+            </a:r>
+            <a:r>
+              <a:rPr lang="en-US" sz="2400" b="1" dirty="0" smtClean="0"/>
+              <a:t>V2)</a:t>
+            </a:r>
+          </a:p>
+          <a:p>
+            <a:pPr algn="ctr"/>
+            <a:r>
+              <a:rPr lang="en-US" sz="2400" b="1" dirty="0" smtClean="0"/>
+              <a:t>Once for JUMO, Once for PIED</a:t>
+            </a:r>
+            <a:r>
+              <a:rPr lang="en-US" sz="2400" b="1" dirty="0" smtClean="0"/>
+              <a:t> </a:t>
             </a:r>
             <a:endParaRPr lang="en-US" sz="2400" b="1" dirty="0"/>
           </a:p>
@@ -3251,7 +3290,7 @@
         </p:nvSpPr>
         <p:spPr>
           <a:xfrm>
-            <a:off x="7095066" y="2277533"/>
+            <a:off x="6993466" y="1667933"/>
             <a:ext cx="1388533" cy="381000"/>
           </a:xfrm>
           <a:prstGeom prst="rect">
@@ -3282,7 +3321,7 @@
         </p:nvSpPr>
         <p:spPr>
           <a:xfrm>
-            <a:off x="4309534" y="2289201"/>
+            <a:off x="3598334" y="1679601"/>
             <a:ext cx="1989667" cy="369332"/>
           </a:xfrm>
           <a:prstGeom prst="rect">
@@ -3313,7 +3352,7 @@
         </p:nvSpPr>
         <p:spPr>
           <a:xfrm>
-            <a:off x="524934" y="2277533"/>
+            <a:off x="135468" y="1679601"/>
             <a:ext cx="3124200" cy="381000"/>
           </a:xfrm>
           <a:prstGeom prst="rect">
@@ -3386,7 +3425,7 @@
         </p:nvSpPr>
         <p:spPr>
           <a:xfrm>
-            <a:off x="6857998" y="3268133"/>
+            <a:off x="6688665" y="2175932"/>
             <a:ext cx="1905001" cy="728134"/>
           </a:xfrm>
           <a:prstGeom prst="leftArrow">
@@ -3428,7 +3467,7 @@
         </p:nvSpPr>
         <p:spPr>
           <a:xfrm>
-            <a:off x="4309534" y="3268133"/>
+            <a:off x="3598334" y="2060601"/>
             <a:ext cx="1905001" cy="728134"/>
           </a:xfrm>
           <a:prstGeom prst="leftArrow">
@@ -3470,7 +3509,7 @@
         </p:nvSpPr>
         <p:spPr>
           <a:xfrm>
-            <a:off x="524934" y="3268133"/>
+            <a:off x="1193800" y="2904066"/>
             <a:ext cx="999066" cy="728134"/>
           </a:xfrm>
           <a:prstGeom prst="roundRect">
@@ -3530,48 +3569,6 @@
             <a:r>
               <a:rPr lang="en-US" dirty="0" smtClean="0"/>
               <a:t>Key:</a:t>
-            </a:r>
-            <a:endParaRPr lang="en-US" dirty="0"/>
-          </a:p>
-        </p:txBody>
-      </p:sp>
-      <p:sp>
-        <p:nvSpPr>
-          <p:cNvPr id="19" name="Left Arrow 18"/>
-          <p:cNvSpPr/>
-          <p:nvPr/>
-        </p:nvSpPr>
-        <p:spPr>
-          <a:xfrm>
-            <a:off x="1896533" y="3268133"/>
-            <a:ext cx="1905001" cy="728134"/>
-          </a:xfrm>
-          <a:prstGeom prst="leftArrow">
-            <a:avLst/>
-          </a:prstGeom>
-        </p:spPr>
-        <p:style>
-          <a:lnRef idx="1">
-            <a:schemeClr val="accent1"/>
-          </a:lnRef>
-          <a:fillRef idx="3">
-            <a:schemeClr val="accent1"/>
-          </a:fillRef>
-          <a:effectRef idx="2">
-            <a:schemeClr val="accent1"/>
-          </a:effectRef>
-          <a:fontRef idx="minor">
-            <a:schemeClr val="lt1"/>
-          </a:fontRef>
-        </p:style>
-        <p:txBody>
-          <a:bodyPr rtlCol="0" anchor="ctr"/>
-          <a:lstStyle/>
-          <a:p>
-            <a:pPr algn="ctr"/>
-            <a:r>
-              <a:rPr lang="en-US" dirty="0" smtClean="0"/>
-              <a:t>Soil Moisture</a:t>
             </a:r>
             <a:endParaRPr lang="en-US" dirty="0"/>
           </a:p>
@@ -3614,6 +3611,140 @@
             <a:r>
               <a:rPr lang="en-US" dirty="0" smtClean="0"/>
               <a:t>Response</a:t>
+            </a:r>
+            <a:endParaRPr lang="en-US" dirty="0"/>
+          </a:p>
+        </p:txBody>
+      </p:sp>
+      <p:sp>
+        <p:nvSpPr>
+          <p:cNvPr id="18" name="Left Arrow 17"/>
+          <p:cNvSpPr/>
+          <p:nvPr/>
+        </p:nvSpPr>
+        <p:spPr>
+          <a:xfrm>
+            <a:off x="3598334" y="2904066"/>
+            <a:ext cx="1905001" cy="728134"/>
+          </a:xfrm>
+          <a:prstGeom prst="leftArrow">
+            <a:avLst/>
+          </a:prstGeom>
+        </p:spPr>
+        <p:style>
+          <a:lnRef idx="1">
+            <a:schemeClr val="accent1"/>
+          </a:lnRef>
+          <a:fillRef idx="3">
+            <a:schemeClr val="accent1"/>
+          </a:fillRef>
+          <a:effectRef idx="2">
+            <a:schemeClr val="accent1"/>
+          </a:effectRef>
+          <a:fontRef idx="minor">
+            <a:schemeClr val="lt1"/>
+          </a:fontRef>
+        </p:style>
+        <p:txBody>
+          <a:bodyPr rtlCol="0" anchor="ctr"/>
+          <a:lstStyle/>
+          <a:p>
+            <a:pPr algn="ctr"/>
+            <a:r>
+              <a:rPr lang="en-US" dirty="0" smtClean="0"/>
+              <a:t>Soil </a:t>
+            </a:r>
+            <a:r>
+              <a:rPr lang="en-US" dirty="0" smtClean="0"/>
+              <a:t>Moisture (shallow)</a:t>
+            </a:r>
+            <a:endParaRPr lang="en-US" dirty="0"/>
+          </a:p>
+        </p:txBody>
+      </p:sp>
+      <p:sp>
+        <p:nvSpPr>
+          <p:cNvPr id="20" name="Left Arrow 19"/>
+          <p:cNvSpPr/>
+          <p:nvPr/>
+        </p:nvSpPr>
+        <p:spPr>
+          <a:xfrm>
+            <a:off x="3598334" y="3759200"/>
+            <a:ext cx="1905001" cy="728134"/>
+          </a:xfrm>
+          <a:prstGeom prst="leftArrow">
+            <a:avLst/>
+          </a:prstGeom>
+        </p:spPr>
+        <p:style>
+          <a:lnRef idx="1">
+            <a:schemeClr val="accent1"/>
+          </a:lnRef>
+          <a:fillRef idx="3">
+            <a:schemeClr val="accent1"/>
+          </a:fillRef>
+          <a:effectRef idx="2">
+            <a:schemeClr val="accent1"/>
+          </a:effectRef>
+          <a:fontRef idx="minor">
+            <a:schemeClr val="lt1"/>
+          </a:fontRef>
+        </p:style>
+        <p:txBody>
+          <a:bodyPr rtlCol="0" anchor="ctr"/>
+          <a:lstStyle/>
+          <a:p>
+            <a:pPr algn="ctr"/>
+            <a:r>
+              <a:rPr lang="en-US" dirty="0" smtClean="0"/>
+              <a:t>Soil </a:t>
+            </a:r>
+            <a:r>
+              <a:rPr lang="en-US" dirty="0" smtClean="0"/>
+              <a:t>Moisture (deep)</a:t>
+            </a:r>
+            <a:endParaRPr lang="en-US" dirty="0"/>
+          </a:p>
+        </p:txBody>
+      </p:sp>
+      <p:sp>
+        <p:nvSpPr>
+          <p:cNvPr id="23" name="Left Arrow 22"/>
+          <p:cNvSpPr/>
+          <p:nvPr/>
+        </p:nvSpPr>
+        <p:spPr>
+          <a:xfrm>
+            <a:off x="6688665" y="3268133"/>
+            <a:ext cx="1905001" cy="728134"/>
+          </a:xfrm>
+          <a:prstGeom prst="leftArrow">
+            <a:avLst/>
+          </a:prstGeom>
+        </p:spPr>
+        <p:style>
+          <a:lnRef idx="1">
+            <a:schemeClr val="accent1"/>
+          </a:lnRef>
+          <a:fillRef idx="3">
+            <a:schemeClr val="accent1"/>
+          </a:fillRef>
+          <a:effectRef idx="2">
+            <a:schemeClr val="accent1"/>
+          </a:effectRef>
+          <a:fontRef idx="minor">
+            <a:schemeClr val="lt1"/>
+          </a:fontRef>
+        </p:style>
+        <p:txBody>
+          <a:bodyPr rtlCol="0" anchor="ctr"/>
+          <a:lstStyle/>
+          <a:p>
+            <a:pPr algn="ctr"/>
+            <a:r>
+              <a:rPr lang="en-US" dirty="0" smtClean="0"/>
+              <a:t>Pre-rain Totals</a:t>
             </a:r>
             <a:endParaRPr lang="en-US" dirty="0"/>
           </a:p>

</xml_diff>